<commit_message>
Update presentation 03 from meeting 11/04
</commit_message>
<xml_diff>
--- a/Presentations/Presentation03.pptx
+++ b/Presentations/Presentation03.pptx
@@ -5,32 +5,33 @@
     <p:sldMasterId id="2147483659" r:id="rId1"/>
   </p:sldMasterIdLst>
   <p:notesMasterIdLst>
-    <p:notesMasterId r:id="rId8"/>
+    <p:notesMasterId r:id="rId9"/>
   </p:notesMasterIdLst>
   <p:sldIdLst>
     <p:sldId id="256" r:id="rId2"/>
     <p:sldId id="258" r:id="rId3"/>
     <p:sldId id="259" r:id="rId4"/>
-    <p:sldId id="260" r:id="rId5"/>
-    <p:sldId id="261" r:id="rId6"/>
-    <p:sldId id="262" r:id="rId7"/>
+    <p:sldId id="263" r:id="rId5"/>
+    <p:sldId id="260" r:id="rId6"/>
+    <p:sldId id="261" r:id="rId7"/>
+    <p:sldId id="262" r:id="rId8"/>
   </p:sldIdLst>
   <p:sldSz cx="9144000" cy="5143500" type="screen16x9"/>
   <p:notesSz cx="6858000" cy="9144000"/>
   <p:embeddedFontLst>
     <p:embeddedFont>
       <p:font typeface="Lato" panose="020B0604020202020204" charset="0"/>
-      <p:regular r:id="rId9"/>
-      <p:bold r:id="rId10"/>
-      <p:italic r:id="rId11"/>
-      <p:boldItalic r:id="rId12"/>
+      <p:regular r:id="rId10"/>
+      <p:bold r:id="rId11"/>
+      <p:italic r:id="rId12"/>
+      <p:boldItalic r:id="rId13"/>
     </p:embeddedFont>
     <p:embeddedFont>
       <p:font typeface="Raleway" panose="020B0604020202020204" charset="0"/>
-      <p:regular r:id="rId13"/>
-      <p:bold r:id="rId14"/>
-      <p:italic r:id="rId15"/>
-      <p:boldItalic r:id="rId16"/>
+      <p:regular r:id="rId14"/>
+      <p:bold r:id="rId15"/>
+      <p:italic r:id="rId16"/>
+      <p:boldItalic r:id="rId17"/>
     </p:embeddedFont>
   </p:embeddedFontLst>
   <p:defaultTextStyle>
@@ -11151,22 +11152,6 @@
               <a:sym typeface="Arial"/>
             </a:endParaRPr>
           </a:p>
-          <a:p>
-            <a:pPr marL="0" lvl="0" indent="0" algn="l" rtl="0">
-              <a:lnSpc>
-                <a:spcPct val="100000"/>
-              </a:lnSpc>
-              <a:spcBef>
-                <a:spcPts val="0"/>
-              </a:spcBef>
-              <a:spcAft>
-                <a:spcPts val="0"/>
-              </a:spcAft>
-              <a:buSzPts val="4200"/>
-              <a:buNone/>
-            </a:pPr>
-            <a:endParaRPr sz="3500" dirty="0"/>
-          </a:p>
         </p:txBody>
       </p:sp>
       <p:sp>
@@ -11617,7 +11602,7 @@
           <a:p>
             <a:r>
               <a:rPr lang="en-US" dirty="0"/>
-              <a:t>What is the main scientific question (or questions) that you are trying to answer.  Be specific!</a:t>
+              <a:t>What is the main scientific question (or questions) that you are trying to answer? Be specific!</a:t>
             </a:r>
           </a:p>
         </p:txBody>
@@ -11631,6 +11616,114 @@
 </file>
 
 <file path=ppt/slides/slide4.xml><?xml version="1.0" encoding="utf-8"?>
+<p:sld xmlns:a="http://schemas.openxmlformats.org/drawingml/2006/main" xmlns:r="http://schemas.openxmlformats.org/officeDocument/2006/relationships" xmlns:p="http://schemas.openxmlformats.org/presentationml/2006/main">
+  <p:cSld>
+    <p:spTree>
+      <p:nvGrpSpPr>
+        <p:cNvPr id="1" name=""/>
+        <p:cNvGrpSpPr/>
+        <p:nvPr/>
+      </p:nvGrpSpPr>
+      <p:grpSpPr>
+        <a:xfrm>
+          <a:off x="0" y="0"/>
+          <a:ext cx="0" cy="0"/>
+          <a:chOff x="0" y="0"/>
+          <a:chExt cx="0" cy="0"/>
+        </a:xfrm>
+      </p:grpSpPr>
+      <p:sp>
+        <p:nvSpPr>
+          <p:cNvPr id="2" name="Title 1">
+            <a:extLst>
+              <a:ext uri="{FF2B5EF4-FFF2-40B4-BE49-F238E27FC236}">
+                <a16:creationId xmlns:a16="http://schemas.microsoft.com/office/drawing/2014/main" id="{DC4D1CB5-2AC5-467E-8763-2A62CD0CFB6E}"/>
+              </a:ext>
+            </a:extLst>
+          </p:cNvPr>
+          <p:cNvSpPr>
+            <a:spLocks noGrp="1"/>
+          </p:cNvSpPr>
+          <p:nvPr>
+            <p:ph type="title"/>
+          </p:nvPr>
+        </p:nvSpPr>
+        <p:spPr/>
+        <p:txBody>
+          <a:bodyPr/>
+          <a:lstStyle/>
+          <a:p>
+            <a:r>
+              <a:rPr lang="en-US" dirty="0"/>
+              <a:t>Initial Exploration - Clustering</a:t>
+            </a:r>
+          </a:p>
+        </p:txBody>
+      </p:sp>
+      <p:sp>
+        <p:nvSpPr>
+          <p:cNvPr id="3" name="Text Placeholder 2">
+            <a:extLst>
+              <a:ext uri="{FF2B5EF4-FFF2-40B4-BE49-F238E27FC236}">
+                <a16:creationId xmlns:a16="http://schemas.microsoft.com/office/drawing/2014/main" id="{48CCE442-8B3B-4F7A-9832-34510CFA81C9}"/>
+              </a:ext>
+            </a:extLst>
+          </p:cNvPr>
+          <p:cNvSpPr>
+            <a:spLocks noGrp="1"/>
+          </p:cNvSpPr>
+          <p:nvPr>
+            <p:ph type="body" idx="1"/>
+          </p:nvPr>
+        </p:nvSpPr>
+        <p:spPr/>
+        <p:txBody>
+          <a:bodyPr/>
+          <a:lstStyle/>
+          <a:p>
+            <a:endParaRPr lang="en-US"/>
+          </a:p>
+        </p:txBody>
+      </p:sp>
+      <p:sp>
+        <p:nvSpPr>
+          <p:cNvPr id="4" name="Text Placeholder 3">
+            <a:extLst>
+              <a:ext uri="{FF2B5EF4-FFF2-40B4-BE49-F238E27FC236}">
+                <a16:creationId xmlns:a16="http://schemas.microsoft.com/office/drawing/2014/main" id="{8183FF7E-385C-4E7D-AF05-828445D7DCCB}"/>
+              </a:ext>
+            </a:extLst>
+          </p:cNvPr>
+          <p:cNvSpPr>
+            <a:spLocks noGrp="1"/>
+          </p:cNvSpPr>
+          <p:nvPr>
+            <p:ph type="body" idx="2"/>
+          </p:nvPr>
+        </p:nvSpPr>
+        <p:spPr/>
+        <p:txBody>
+          <a:bodyPr/>
+          <a:lstStyle/>
+          <a:p>
+            <a:endParaRPr lang="en-US"/>
+          </a:p>
+        </p:txBody>
+      </p:sp>
+    </p:spTree>
+    <p:extLst>
+      <p:ext uri="{BB962C8B-B14F-4D97-AF65-F5344CB8AC3E}">
+        <p14:creationId xmlns:p14="http://schemas.microsoft.com/office/powerpoint/2010/main" val="2058888472"/>
+      </p:ext>
+    </p:extLst>
+  </p:cSld>
+  <p:clrMapOvr>
+    <a:masterClrMapping/>
+  </p:clrMapOvr>
+</p:sld>
+</file>
+
+<file path=ppt/slides/slide5.xml><?xml version="1.0" encoding="utf-8"?>
 <p:sld xmlns:a="http://schemas.openxmlformats.org/drawingml/2006/main" xmlns:r="http://schemas.openxmlformats.org/officeDocument/2006/relationships" xmlns:p="http://schemas.openxmlformats.org/presentationml/2006/main">
   <p:cSld>
     <p:spTree>
@@ -11691,7 +11784,12 @@
             <p:ph type="body" idx="1"/>
           </p:nvPr>
         </p:nvSpPr>
-        <p:spPr/>
+        <p:spPr>
+          <a:xfrm>
+            <a:off x="729325" y="2078874"/>
+            <a:ext cx="3774300" cy="2466999"/>
+          </a:xfrm>
+        </p:spPr>
         <p:txBody>
           <a:bodyPr/>
           <a:lstStyle/>
@@ -11741,7 +11839,7 @@
 </p:sld>
 </file>
 
-<file path=ppt/slides/slide5.xml><?xml version="1.0" encoding="utf-8"?>
+<file path=ppt/slides/slide6.xml><?xml version="1.0" encoding="utf-8"?>
 <p:sld xmlns:a="http://schemas.openxmlformats.org/drawingml/2006/main" xmlns:r="http://schemas.openxmlformats.org/officeDocument/2006/relationships" xmlns:p="http://schemas.openxmlformats.org/presentationml/2006/main">
   <p:cSld>
     <p:spTree>
@@ -11849,7 +11947,7 @@
 </p:sld>
 </file>
 
-<file path=ppt/slides/slide6.xml><?xml version="1.0" encoding="utf-8"?>
+<file path=ppt/slides/slide7.xml><?xml version="1.0" encoding="utf-8"?>
 <p:sld xmlns:a="http://schemas.openxmlformats.org/drawingml/2006/main" xmlns:r="http://schemas.openxmlformats.org/officeDocument/2006/relationships" xmlns:p="http://schemas.openxmlformats.org/presentationml/2006/main">
   <p:cSld>
     <p:spTree>

</xml_diff>

<commit_message>
Beau add interesting things to Task 3
</commit_message>
<xml_diff>
--- a/Presentations/Presentation03.pptx
+++ b/Presentations/Presentation03.pptx
@@ -5,7 +5,7 @@
     <p:sldMasterId id="2147483659" r:id="rId1"/>
   </p:sldMasterIdLst>
   <p:notesMasterIdLst>
-    <p:notesMasterId r:id="rId9"/>
+    <p:notesMasterId r:id="rId10"/>
   </p:notesMasterIdLst>
   <p:sldIdLst>
     <p:sldId id="256" r:id="rId2"/>
@@ -15,23 +15,24 @@
     <p:sldId id="260" r:id="rId6"/>
     <p:sldId id="261" r:id="rId7"/>
     <p:sldId id="262" r:id="rId8"/>
+    <p:sldId id="264" r:id="rId9"/>
   </p:sldIdLst>
   <p:sldSz cx="9144000" cy="5143500" type="screen16x9"/>
   <p:notesSz cx="6858000" cy="9144000"/>
   <p:embeddedFontLst>
     <p:embeddedFont>
       <p:font typeface="Lato" panose="020B0604020202020204" charset="0"/>
-      <p:regular r:id="rId10"/>
-      <p:bold r:id="rId11"/>
-      <p:italic r:id="rId12"/>
-      <p:boldItalic r:id="rId13"/>
+      <p:regular r:id="rId11"/>
+      <p:bold r:id="rId12"/>
+      <p:italic r:id="rId13"/>
+      <p:boldItalic r:id="rId14"/>
     </p:embeddedFont>
     <p:embeddedFont>
       <p:font typeface="Raleway" panose="020B0604020202020204" charset="0"/>
-      <p:regular r:id="rId14"/>
-      <p:bold r:id="rId15"/>
-      <p:italic r:id="rId16"/>
-      <p:boldItalic r:id="rId17"/>
+      <p:regular r:id="rId15"/>
+      <p:bold r:id="rId16"/>
+      <p:italic r:id="rId17"/>
+      <p:boldItalic r:id="rId18"/>
     </p:embeddedFont>
   </p:embeddedFontLst>
   <p:defaultTextStyle>
@@ -12008,6 +12009,219 @@
             <p:ph type="body" idx="1"/>
           </p:nvPr>
         </p:nvSpPr>
+        <p:spPr>
+          <a:xfrm>
+            <a:off x="616527" y="2078875"/>
+            <a:ext cx="3247818" cy="1437409"/>
+          </a:xfrm>
+        </p:spPr>
+        <p:txBody>
+          <a:bodyPr/>
+          <a:lstStyle/>
+          <a:p>
+            <a:r>
+              <a:rPr lang="en-US" dirty="0"/>
+              <a:t>The time component of our data is relatively negligible and any trends observed are due to seasonal patterns explained by month alone.</a:t>
+            </a:r>
+          </a:p>
+        </p:txBody>
+      </p:sp>
+      <p:pic>
+        <p:nvPicPr>
+          <p:cNvPr id="8" name="Picture 7">
+            <a:extLst>
+              <a:ext uri="{FF2B5EF4-FFF2-40B4-BE49-F238E27FC236}">
+                <a16:creationId xmlns:a16="http://schemas.microsoft.com/office/drawing/2014/main" id="{A18019E9-83DF-4688-8ECA-FA4D70A37D94}"/>
+              </a:ext>
+            </a:extLst>
+          </p:cNvPr>
+          <p:cNvPicPr>
+            <a:picLocks/>
+          </p:cNvPicPr>
+          <p:nvPr/>
+        </p:nvPicPr>
+        <p:blipFill>
+          <a:blip r:embed="rId2"/>
+          <a:stretch>
+            <a:fillRect/>
+          </a:stretch>
+        </p:blipFill>
+        <p:spPr>
+          <a:xfrm>
+            <a:off x="567913" y="3654175"/>
+            <a:ext cx="1920240" cy="1371600"/>
+          </a:xfrm>
+          <a:prstGeom prst="rect">
+            <a:avLst/>
+          </a:prstGeom>
+        </p:spPr>
+      </p:pic>
+      <p:pic>
+        <p:nvPicPr>
+          <p:cNvPr id="15" name="Picture 14">
+            <a:extLst>
+              <a:ext uri="{FF2B5EF4-FFF2-40B4-BE49-F238E27FC236}">
+                <a16:creationId xmlns:a16="http://schemas.microsoft.com/office/drawing/2014/main" id="{2D039A81-B75A-431D-8FFE-C94807C27A58}"/>
+              </a:ext>
+            </a:extLst>
+          </p:cNvPr>
+          <p:cNvPicPr>
+            <a:picLocks/>
+          </p:cNvPicPr>
+          <p:nvPr/>
+        </p:nvPicPr>
+        <p:blipFill>
+          <a:blip r:embed="rId3"/>
+          <a:stretch>
+            <a:fillRect/>
+          </a:stretch>
+        </p:blipFill>
+        <p:spPr>
+          <a:xfrm>
+            <a:off x="4661159" y="3654175"/>
+            <a:ext cx="1920240" cy="1371600"/>
+          </a:xfrm>
+          <a:prstGeom prst="rect">
+            <a:avLst/>
+          </a:prstGeom>
+        </p:spPr>
+      </p:pic>
+      <p:pic>
+        <p:nvPicPr>
+          <p:cNvPr id="16" name="Picture 15">
+            <a:extLst>
+              <a:ext uri="{FF2B5EF4-FFF2-40B4-BE49-F238E27FC236}">
+                <a16:creationId xmlns:a16="http://schemas.microsoft.com/office/drawing/2014/main" id="{4DFAFA67-8910-4B42-BE47-27214B20430D}"/>
+              </a:ext>
+            </a:extLst>
+          </p:cNvPr>
+          <p:cNvPicPr>
+            <a:picLocks/>
+          </p:cNvPicPr>
+          <p:nvPr/>
+        </p:nvPicPr>
+        <p:blipFill>
+          <a:blip r:embed="rId4"/>
+          <a:stretch>
+            <a:fillRect/>
+          </a:stretch>
+        </p:blipFill>
+        <p:spPr>
+          <a:xfrm>
+            <a:off x="2593754" y="3654175"/>
+            <a:ext cx="1920240" cy="1371600"/>
+          </a:xfrm>
+          <a:prstGeom prst="rect">
+            <a:avLst/>
+          </a:prstGeom>
+        </p:spPr>
+      </p:pic>
+      <p:pic>
+        <p:nvPicPr>
+          <p:cNvPr id="17" name="Picture 16">
+            <a:extLst>
+              <a:ext uri="{FF2B5EF4-FFF2-40B4-BE49-F238E27FC236}">
+                <a16:creationId xmlns:a16="http://schemas.microsoft.com/office/drawing/2014/main" id="{91378E66-9BE5-4F8A-91BF-A96035E23554}"/>
+              </a:ext>
+            </a:extLst>
+          </p:cNvPr>
+          <p:cNvPicPr>
+            <a:picLocks/>
+          </p:cNvPicPr>
+          <p:nvPr/>
+        </p:nvPicPr>
+        <p:blipFill>
+          <a:blip r:embed="rId5"/>
+          <a:stretch>
+            <a:fillRect/>
+          </a:stretch>
+        </p:blipFill>
+        <p:spPr>
+          <a:xfrm>
+            <a:off x="6687000" y="3654175"/>
+            <a:ext cx="1920240" cy="1371600"/>
+          </a:xfrm>
+          <a:prstGeom prst="rect">
+            <a:avLst/>
+          </a:prstGeom>
+        </p:spPr>
+      </p:pic>
+      <p:pic>
+        <p:nvPicPr>
+          <p:cNvPr id="19" name="Picture 18">
+            <a:extLst>
+              <a:ext uri="{FF2B5EF4-FFF2-40B4-BE49-F238E27FC236}">
+                <a16:creationId xmlns:a16="http://schemas.microsoft.com/office/drawing/2014/main" id="{2BB66E53-20D1-4E8C-9A42-0B36437BA8D9}"/>
+              </a:ext>
+            </a:extLst>
+          </p:cNvPr>
+          <p:cNvPicPr>
+            <a:picLocks noChangeAspect="1"/>
+          </p:cNvPicPr>
+          <p:nvPr/>
+        </p:nvPicPr>
+        <p:blipFill>
+          <a:blip r:embed="rId6"/>
+          <a:stretch>
+            <a:fillRect/>
+          </a:stretch>
+        </p:blipFill>
+        <p:spPr>
+          <a:xfrm>
+            <a:off x="3906981" y="641465"/>
+            <a:ext cx="5098473" cy="2874819"/>
+          </a:xfrm>
+          <a:prstGeom prst="rect">
+            <a:avLst/>
+          </a:prstGeom>
+        </p:spPr>
+      </p:pic>
+    </p:spTree>
+    <p:extLst>
+      <p:ext uri="{BB962C8B-B14F-4D97-AF65-F5344CB8AC3E}">
+        <p14:creationId xmlns:p14="http://schemas.microsoft.com/office/powerpoint/2010/main" val="3033536466"/>
+      </p:ext>
+    </p:extLst>
+  </p:cSld>
+  <p:clrMapOvr>
+    <a:masterClrMapping/>
+  </p:clrMapOvr>
+</p:sld>
+</file>
+
+<file path=ppt/slides/slide8.xml><?xml version="1.0" encoding="utf-8"?>
+<p:sld xmlns:a="http://schemas.openxmlformats.org/drawingml/2006/main" xmlns:r="http://schemas.openxmlformats.org/officeDocument/2006/relationships" xmlns:p="http://schemas.openxmlformats.org/presentationml/2006/main">
+  <p:cSld>
+    <p:spTree>
+      <p:nvGrpSpPr>
+        <p:cNvPr id="1" name=""/>
+        <p:cNvGrpSpPr/>
+        <p:nvPr/>
+      </p:nvGrpSpPr>
+      <p:grpSpPr>
+        <a:xfrm>
+          <a:off x="0" y="0"/>
+          <a:ext cx="0" cy="0"/>
+          <a:chOff x="0" y="0"/>
+          <a:chExt cx="0" cy="0"/>
+        </a:xfrm>
+      </p:grpSpPr>
+      <p:sp>
+        <p:nvSpPr>
+          <p:cNvPr id="2" name="Title 1">
+            <a:extLst>
+              <a:ext uri="{FF2B5EF4-FFF2-40B4-BE49-F238E27FC236}">
+                <a16:creationId xmlns:a16="http://schemas.microsoft.com/office/drawing/2014/main" id="{DC09D0F8-1DAC-43BA-B04E-A9B1DB8DB149}"/>
+              </a:ext>
+            </a:extLst>
+          </p:cNvPr>
+          <p:cNvSpPr>
+            <a:spLocks noGrp="1"/>
+          </p:cNvSpPr>
+          <p:nvPr>
+            <p:ph type="title"/>
+          </p:nvPr>
+        </p:nvSpPr>
         <p:spPr/>
         <p:txBody>
           <a:bodyPr/>
@@ -12015,17 +12229,17 @@
           <a:p>
             <a:r>
               <a:rPr lang="en-US" dirty="0"/>
-              <a:t>What is the most interesting (to you) thing you have discovered so far about your main scientific question(s)?  </a:t>
+              <a:t>Interesting Things</a:t>
             </a:r>
           </a:p>
         </p:txBody>
       </p:sp>
       <p:sp>
         <p:nvSpPr>
-          <p:cNvPr id="4" name="Text Placeholder 3">
+          <p:cNvPr id="3" name="Text Placeholder 2">
             <a:extLst>
               <a:ext uri="{FF2B5EF4-FFF2-40B4-BE49-F238E27FC236}">
-                <a16:creationId xmlns:a16="http://schemas.microsoft.com/office/drawing/2014/main" id="{A26CC735-FB35-4EB3-BD7C-15C38C838952}"/>
+                <a16:creationId xmlns:a16="http://schemas.microsoft.com/office/drawing/2014/main" id="{51A983B7-1228-4B6A-B1C3-3DA70F030999}"/>
               </a:ext>
             </a:extLst>
           </p:cNvPr>
@@ -12033,22 +12247,81 @@
             <a:spLocks noGrp="1"/>
           </p:cNvSpPr>
           <p:nvPr>
-            <p:ph type="body" idx="2"/>
+            <p:ph type="body" idx="1"/>
           </p:nvPr>
         </p:nvSpPr>
-        <p:spPr/>
+        <p:spPr>
+          <a:xfrm>
+            <a:off x="729325" y="2078875"/>
+            <a:ext cx="3475530" cy="2261100"/>
+          </a:xfrm>
+        </p:spPr>
         <p:txBody>
           <a:bodyPr/>
           <a:lstStyle/>
           <a:p>
-            <a:endParaRPr lang="en-US"/>
+            <a:pPr marL="146050" indent="0">
+              <a:buNone/>
+            </a:pPr>
+            <a:r>
+              <a:rPr lang="en-US" b="1" dirty="0"/>
+              <a:t>Impact to Our Project:</a:t>
+            </a:r>
+          </a:p>
+          <a:p>
+            <a:r>
+              <a:rPr lang="en-US" dirty="0"/>
+              <a:t>Ignore possible autocorrelation in our data</a:t>
+            </a:r>
+          </a:p>
+          <a:p>
+            <a:r>
+              <a:rPr lang="en-US" dirty="0"/>
+              <a:t>Can drop some correlated variables like month with temperature</a:t>
+            </a:r>
+          </a:p>
+          <a:p>
+            <a:r>
+              <a:rPr lang="en-US" dirty="0"/>
+              <a:t>Enables us to use the broader range of supervised method (like MARS) instead of time-series only methods</a:t>
+            </a:r>
           </a:p>
         </p:txBody>
       </p:sp>
+      <p:pic>
+        <p:nvPicPr>
+          <p:cNvPr id="7" name="Picture 6">
+            <a:extLst>
+              <a:ext uri="{FF2B5EF4-FFF2-40B4-BE49-F238E27FC236}">
+                <a16:creationId xmlns:a16="http://schemas.microsoft.com/office/drawing/2014/main" id="{3FE0028D-694B-4468-9A71-FBCF0FCBC98B}"/>
+              </a:ext>
+            </a:extLst>
+          </p:cNvPr>
+          <p:cNvPicPr>
+            <a:picLocks noChangeAspect="1"/>
+          </p:cNvPicPr>
+          <p:nvPr/>
+        </p:nvPicPr>
+        <p:blipFill>
+          <a:blip r:embed="rId2"/>
+          <a:stretch>
+            <a:fillRect/>
+          </a:stretch>
+        </p:blipFill>
+        <p:spPr>
+          <a:xfrm>
+            <a:off x="4301836" y="1191491"/>
+            <a:ext cx="4571719" cy="3290454"/>
+          </a:xfrm>
+          <a:prstGeom prst="rect">
+            <a:avLst/>
+          </a:prstGeom>
+        </p:spPr>
+      </p:pic>
     </p:spTree>
     <p:extLst>
       <p:ext uri="{BB962C8B-B14F-4D97-AF65-F5344CB8AC3E}">
-        <p14:creationId xmlns:p14="http://schemas.microsoft.com/office/powerpoint/2010/main" val="3033536466"/>
+        <p14:creationId xmlns:p14="http://schemas.microsoft.com/office/powerpoint/2010/main" val="1636392259"/>
       </p:ext>
     </p:extLst>
   </p:cSld>

</xml_diff>